<commit_message>
Eclipse_CDT IDE RCP js
</commit_message>
<xml_diff>
--- a/pp_template/nonsql/NoSQL.pptx
+++ b/pp_template/nonsql/NoSQL.pptx
@@ -5987,16 +5987,36 @@
               </a:lnSpc>
             </a:pPr>
             <a:r>
-              <a:rPr lang="en-US" sz="1200" b="0" strike="noStrike" spc="-1">
-                <a:solidFill>
-                  <a:srgbClr val="000000"/>
-                </a:solidFill>
-                <a:latin typeface="+mn-lt"/>
-                <a:ea typeface="+mn-ea"/>
-              </a:rPr>
-              <a:t>You can switch to non-existing databases. When you first store data in the database, such as by creating a collection, MongoDB creates the database</a:t>
-            </a:r>
-            <a:endParaRPr lang="en-US" sz="1200" b="0" strike="noStrike" spc="-1">
+              <a:rPr lang="en-US" sz="1200" b="0" strike="noStrike" spc="-1" dirty="0">
+                <a:solidFill>
+                  <a:srgbClr val="000000"/>
+                </a:solidFill>
+                <a:latin typeface="+mn-lt"/>
+                <a:ea typeface="+mn-ea"/>
+              </a:rPr>
+              <a:t>You can switch to non-existing databases. When you first store data in the database, such as by creating a collection, </a:t>
+            </a:r>
+            <a:r>
+              <a:rPr lang="en-US" sz="1200" b="0" strike="noStrike" spc="-1" dirty="0" err="1">
+                <a:solidFill>
+                  <a:srgbClr val="000000"/>
+                </a:solidFill>
+                <a:latin typeface="+mn-lt"/>
+                <a:ea typeface="+mn-ea"/>
+              </a:rPr>
+              <a:t>MongoDB</a:t>
+            </a:r>
+            <a:r>
+              <a:rPr lang="en-US" sz="1200" b="0" strike="noStrike" spc="-1" dirty="0">
+                <a:solidFill>
+                  <a:srgbClr val="000000"/>
+                </a:solidFill>
+                <a:latin typeface="+mn-lt"/>
+                <a:ea typeface="+mn-ea"/>
+              </a:rPr>
+              <a:t> creates the database</a:t>
+            </a:r>
+            <a:endParaRPr lang="en-US" sz="1200" b="0" strike="noStrike" spc="-1" dirty="0">
               <a:latin typeface="Arial"/>
             </a:endParaRPr>
           </a:p>
@@ -6006,7 +6026,7 @@
                 <a:spcPct val="100000"/>
               </a:lnSpc>
             </a:pPr>
-            <a:endParaRPr lang="en-US" sz="1200" b="0" strike="noStrike" spc="-1">
+            <a:endParaRPr lang="en-US" sz="1200" b="0" strike="noStrike" spc="-1" dirty="0">
               <a:latin typeface="Arial"/>
             </a:endParaRPr>
           </a:p>
@@ -6017,7 +6037,7 @@
               </a:lnSpc>
             </a:pPr>
             <a:r>
-              <a:rPr lang="en-US" sz="1200" b="0" strike="noStrike" spc="-1">
+              <a:rPr lang="en-US" sz="1200" b="0" strike="noStrike" spc="-1" dirty="0">
                 <a:solidFill>
                   <a:srgbClr val="000000"/>
                 </a:solidFill>
@@ -6026,7 +6046,7 @@
               </a:rPr>
               <a:t>To see the implementation of a method in the shell, type the db.&lt;method name&gt; without the parenthesis </a:t>
             </a:r>
-            <a:endParaRPr lang="en-US" sz="1200" b="0" strike="noStrike" spc="-1">
+            <a:endParaRPr lang="en-US" sz="1200" b="0" strike="noStrike" spc="-1" dirty="0">
               <a:latin typeface="Arial"/>
             </a:endParaRPr>
           </a:p>
@@ -6583,10 +6603,16 @@
               </a:lnSpc>
             </a:pPr>
             <a:r>
-              <a:rPr lang="en-US" sz="1800" b="0" strike="noStrike" spc="-1">
+              <a:rPr lang="en-US" sz="1800" b="0" strike="noStrike" spc="-1" dirty="0" err="1">
                 <a:latin typeface="Arial"/>
               </a:rPr>
-              <a:t>db.inventory.find( { tags: { $all: ["red", "blank"] } } )</a:t>
+              <a:t>db.inventory.find</a:t>
+            </a:r>
+            <a:r>
+              <a:rPr lang="en-US" sz="1800" b="0" strike="noStrike" spc="-1" dirty="0">
+                <a:latin typeface="Arial"/>
+              </a:rPr>
+              <a:t>( { tags: { $all: ["red", "blank"] } } )</a:t>
             </a:r>
           </a:p>
           <a:p>
@@ -6596,10 +6622,52 @@
               </a:lnSpc>
             </a:pPr>
             <a:r>
-              <a:rPr lang="en-US" sz="1800" b="0" strike="noStrike" spc="-1">
+              <a:rPr lang="en-US" sz="1800" b="0" strike="noStrike" spc="-1" dirty="0" err="1">
                 <a:latin typeface="Arial"/>
               </a:rPr>
-              <a:t>db.inventory.find( { dim_cm: { $gt: 15, $lt: 20 } } )</a:t>
+              <a:t>db.inventory.find</a:t>
+            </a:r>
+            <a:r>
+              <a:rPr lang="en-US" sz="1800" b="0" strike="noStrike" spc="-1" dirty="0">
+                <a:latin typeface="Arial"/>
+              </a:rPr>
+              <a:t>( { </a:t>
+            </a:r>
+            <a:r>
+              <a:rPr lang="en-US" sz="1800" b="0" strike="noStrike" spc="-1" dirty="0" err="1">
+                <a:latin typeface="Arial"/>
+              </a:rPr>
+              <a:t>dim_cm</a:t>
+            </a:r>
+            <a:r>
+              <a:rPr lang="en-US" sz="1800" b="0" strike="noStrike" spc="-1" dirty="0">
+                <a:latin typeface="Arial"/>
+              </a:rPr>
+              <a:t>: { $</a:t>
+            </a:r>
+            <a:r>
+              <a:rPr lang="en-US" sz="1800" b="0" strike="noStrike" spc="-1" dirty="0" err="1">
+                <a:latin typeface="Arial"/>
+              </a:rPr>
+              <a:t>gt</a:t>
+            </a:r>
+            <a:r>
+              <a:rPr lang="en-US" sz="1800" b="0" strike="noStrike" spc="-1" dirty="0">
+                <a:latin typeface="Arial"/>
+              </a:rPr>
+              <a:t>: 15, $</a:t>
+            </a:r>
+            <a:r>
+              <a:rPr lang="en-US" sz="1800" b="0" strike="noStrike" spc="-1" dirty="0" err="1">
+                <a:latin typeface="Arial"/>
+              </a:rPr>
+              <a:t>lt</a:t>
+            </a:r>
+            <a:r>
+              <a:rPr lang="en-US" sz="1800" b="0" strike="noStrike" spc="-1" dirty="0">
+                <a:latin typeface="Arial"/>
+              </a:rPr>
+              <a:t>: 20 } } )</a:t>
             </a:r>
           </a:p>
           <a:p>
@@ -6609,10 +6677,64 @@
               </a:lnSpc>
             </a:pPr>
             <a:r>
-              <a:rPr lang="en-US" sz="1800" b="0" strike="noStrike" spc="-1">
+              <a:rPr lang="en-US" sz="1800" b="0" strike="noStrike" spc="-1" dirty="0" err="1">
                 <a:latin typeface="Arial"/>
               </a:rPr>
-              <a:t>db.inventory.find( { dim_cm: { $elemMatch: { $gt: 22, $lt: 30 } } } )</a:t>
+              <a:t>db.inventory.find</a:t>
+            </a:r>
+            <a:r>
+              <a:rPr lang="en-US" sz="1800" b="0" strike="noStrike" spc="-1" dirty="0">
+                <a:latin typeface="Arial"/>
+              </a:rPr>
+              <a:t>( { </a:t>
+            </a:r>
+            <a:r>
+              <a:rPr lang="en-US" sz="1800" b="0" strike="noStrike" spc="-1" dirty="0" err="1">
+                <a:latin typeface="Arial"/>
+              </a:rPr>
+              <a:t>dim_cm</a:t>
+            </a:r>
+            <a:r>
+              <a:rPr lang="en-US" sz="1800" b="0" strike="noStrike" spc="-1" dirty="0">
+                <a:latin typeface="Arial"/>
+              </a:rPr>
+              <a:t>: { $</a:t>
+            </a:r>
+            <a:r>
+              <a:rPr lang="en-US" sz="1800" b="0" strike="noStrike" spc="-1" dirty="0" err="1">
+                <a:latin typeface="Arial"/>
+              </a:rPr>
+              <a:t>elemMatch</a:t>
+            </a:r>
+            <a:r>
+              <a:rPr lang="en-US" sz="1800" b="0" strike="noStrike" spc="-1" dirty="0">
+                <a:latin typeface="Arial"/>
+              </a:rPr>
+              <a:t>: { $</a:t>
+            </a:r>
+            <a:r>
+              <a:rPr lang="en-US" sz="1800" b="0" strike="noStrike" spc="-1" dirty="0" err="1">
+                <a:latin typeface="Arial"/>
+              </a:rPr>
+              <a:t>gt</a:t>
+            </a:r>
+            <a:r>
+              <a:rPr lang="en-US" sz="1800" b="0" strike="noStrike" spc="-1" dirty="0">
+                <a:latin typeface="Arial"/>
+              </a:rPr>
+              <a:t>: 22, $</a:t>
+            </a:r>
+            <a:r>
+              <a:rPr lang="en-US" sz="1800" b="0" strike="noStrike" spc="-1" dirty="0" err="1">
+                <a:latin typeface="Arial"/>
+              </a:rPr>
+              <a:t>lt</a:t>
+            </a:r>
+            <a:r>
+              <a:rPr lang="en-US" sz="1800" b="0" strike="noStrike" spc="-1" dirty="0">
+                <a:latin typeface="Arial"/>
+              </a:rPr>
+              <a:t>: 30 } } } )</a:t>
             </a:r>
           </a:p>
           <a:p>
@@ -6622,10 +6744,28 @@
               </a:lnSpc>
             </a:pPr>
             <a:r>
-              <a:rPr lang="en-US" sz="1800" b="0" strike="noStrike" spc="-1">
+              <a:rPr lang="en-US" sz="1800" b="0" strike="noStrike" spc="-1" dirty="0" err="1">
                 <a:latin typeface="Arial"/>
               </a:rPr>
-              <a:t>db.inventory.find( { "dim_cm.1": { $gt: 25 } } )</a:t>
+              <a:t>db.inventory.find</a:t>
+            </a:r>
+            <a:r>
+              <a:rPr lang="en-US" sz="1800" b="0" strike="noStrike" spc="-1" dirty="0">
+                <a:latin typeface="Arial"/>
+              </a:rPr>
+              <a:t>( { "dim_cm.1": { $</a:t>
+            </a:r>
+            <a:r>
+              <a:rPr lang="en-US" sz="1800" b="0" strike="noStrike" spc="-1" dirty="0" err="1">
+                <a:latin typeface="Arial"/>
+              </a:rPr>
+              <a:t>gt</a:t>
+            </a:r>
+            <a:r>
+              <a:rPr lang="en-US" sz="1800" b="0" strike="noStrike" spc="-1" dirty="0">
+                <a:latin typeface="Arial"/>
+              </a:rPr>
+              <a:t>: 25 } } )</a:t>
             </a:r>
           </a:p>
           <a:p>
@@ -6635,10 +6775,16 @@
               </a:lnSpc>
             </a:pPr>
             <a:r>
-              <a:rPr lang="en-US" sz="1800" b="0" strike="noStrike" spc="-1">
+              <a:rPr lang="en-US" sz="1800" b="0" strike="noStrike" spc="-1" dirty="0" err="1">
                 <a:latin typeface="Arial"/>
               </a:rPr>
-              <a:t>db.inventory.find( { "tags": { $size: 3 } } )</a:t>
+              <a:t>db.inventory.find</a:t>
+            </a:r>
+            <a:r>
+              <a:rPr lang="en-US" sz="1800" b="0" strike="noStrike" spc="-1" dirty="0">
+                <a:latin typeface="Arial"/>
+              </a:rPr>
+              <a:t>( { "tags": { $size: 3 } } )</a:t>
             </a:r>
           </a:p>
           <a:p>
@@ -6648,22 +6794,40 @@
               </a:lnSpc>
             </a:pPr>
             <a:r>
-              <a:rPr lang="en-US" sz="1800" b="0" strike="noStrike" spc="-1">
+              <a:rPr lang="en-US" sz="1800" b="0" strike="noStrike" spc="-1" dirty="0" err="1">
                 <a:latin typeface="Arial"/>
               </a:rPr>
-              <a:t>db.inventory.find( { 'instock.</a:t>
-            </a:r>
-            <a:r>
-              <a:rPr lang="en-US" sz="1800" b="1" strike="noStrike" spc="-1">
+              <a:t>db.inventory.find</a:t>
+            </a:r>
+            <a:r>
+              <a:rPr lang="en-US" sz="1800" b="0" strike="noStrike" spc="-1" dirty="0">
                 <a:latin typeface="Arial"/>
               </a:rPr>
+              <a:t>( { 'instock.</a:t>
+            </a:r>
+            <a:r>
+              <a:rPr lang="en-US" sz="1800" b="1" strike="noStrike" spc="-1" dirty="0">
+                <a:latin typeface="Arial"/>
+              </a:rPr>
               <a:t>0</a:t>
             </a:r>
             <a:r>
-              <a:rPr lang="en-US" sz="1800" b="0" strike="noStrike" spc="-1">
+              <a:rPr lang="en-US" sz="1800" b="0" strike="noStrike" spc="-1" dirty="0">
                 <a:latin typeface="Arial"/>
               </a:rPr>
-              <a:t>.qty': { $lte: 20 } } )</a:t>
+              <a:t>.qty': { $</a:t>
+            </a:r>
+            <a:r>
+              <a:rPr lang="en-US" sz="1800" b="0" strike="noStrike" spc="-1" dirty="0" err="1">
+                <a:latin typeface="Arial"/>
+              </a:rPr>
+              <a:t>lte</a:t>
+            </a:r>
+            <a:r>
+              <a:rPr lang="en-US" sz="1800" b="0" strike="noStrike" spc="-1" dirty="0">
+                <a:latin typeface="Arial"/>
+              </a:rPr>
+              <a:t>: 20 } } )</a:t>
             </a:r>
           </a:p>
         </p:txBody>

</xml_diff>